<commit_message>
Extends the Jenkinsfile with approve step.
</commit_message>
<xml_diff>
--- a/Ps-CICD.pptx
+++ b/Ps-CICD.pptx
@@ -12,6 +12,7 @@
     <p:sldId id="260" r:id="rId6"/>
     <p:sldId id="261" r:id="rId7"/>
     <p:sldId id="262" r:id="rId8"/>
+    <p:sldId id="263" r:id="rId9"/>
   </p:sldIdLst>
   <p:sldSz cx="12192000" cy="6858000"/>
   <p:notesSz cx="6858000" cy="9144000"/>
@@ -5484,25 +5485,7 @@
               <a:rPr lang="en-US" dirty="0" smtClean="0">
                 <a:latin typeface="Bell MT" panose="02020503060305020303" pitchFamily="18" charset="0"/>
               </a:rPr>
-              <a:t>Depending on the environment these techniques can be achieved in a different way. If deployments are all done on a Linux platform, or even better in a Kubernetes cluster, it can be pretty easy to setup blue/green </a:t>
-            </a:r>
-            <a:r>
-              <a:rPr lang="en-US" dirty="0" smtClean="0">
-                <a:latin typeface="Bell MT" panose="02020503060305020303" pitchFamily="18" charset="0"/>
-              </a:rPr>
-              <a:t>deployments lets say. </a:t>
-            </a:r>
-            <a:r>
-              <a:rPr lang="en-US" dirty="0" smtClean="0">
-                <a:latin typeface="Bell MT" panose="02020503060305020303" pitchFamily="18" charset="0"/>
-              </a:rPr>
-              <a:t>For Windows platform the automation tools are still not that mature</a:t>
-            </a:r>
-            <a:r>
-              <a:rPr lang="en-US" dirty="0" smtClean="0">
-                <a:latin typeface="Bell MT" panose="02020503060305020303" pitchFamily="18" charset="0"/>
-              </a:rPr>
-              <a:t>.</a:t>
+              <a:t>Depending on the environment these techniques can be achieved in a different way. If deployments are all done on a Linux platform, or even better in a Kubernetes cluster, it can be pretty easy to setup blue/green deployments lets say. For Windows platform the automation tools are still not that mature.</a:t>
             </a:r>
           </a:p>
           <a:p>
@@ -5519,9 +5502,6 @@
               </a:rPr>
               <a:t>After successful production release automated e-mail notification can be setup to notify all the stakeholders, as part of the release pipeline.</a:t>
             </a:r>
-            <a:endParaRPr lang="en-US" dirty="0" smtClean="0">
-              <a:latin typeface="Bell MT" panose="02020503060305020303" pitchFamily="18" charset="0"/>
-            </a:endParaRPr>
           </a:p>
         </p:txBody>
       </p:sp>
@@ -5763,15 +5743,9 @@
           <a:p>
             <a:r>
               <a:rPr lang="en-US" dirty="0" smtClean="0"/>
-              <a:t>Solution for Python services</a:t>
-            </a:r>
-          </a:p>
-          <a:p>
-            <a:r>
-              <a:rPr lang="en-US" sz="1800" dirty="0" smtClean="0"/>
-              <a:t>Deployed on Windows and Linux</a:t>
-            </a:r>
-            <a:endParaRPr lang="en-GB" sz="1800" dirty="0"/>
+              <a:t>Solution</a:t>
+            </a:r>
+            <a:endParaRPr lang="en-US" dirty="0" smtClean="0"/>
           </a:p>
         </p:txBody>
       </p:sp>
@@ -5783,8 +5757,8 @@
         </p:nvSpPr>
         <p:spPr>
           <a:xfrm>
-            <a:off x="838200" y="1779764"/>
-            <a:ext cx="9860547" cy="4031873"/>
+            <a:off x="838200" y="1066532"/>
+            <a:ext cx="9860547" cy="4308872"/>
           </a:xfrm>
           <a:prstGeom prst="rect">
             <a:avLst/>
@@ -5820,8 +5794,23 @@
               <a:rPr lang="en-US" dirty="0" smtClean="0">
                 <a:latin typeface="Bell MT" panose="02020503060305020303" pitchFamily="18" charset="0"/>
               </a:rPr>
-              <a:t> is used for keeping the sources.</a:t>
-            </a:r>
+              <a:t> is used for </a:t>
+            </a:r>
+            <a:r>
+              <a:rPr lang="en-US" dirty="0" smtClean="0">
+                <a:latin typeface="Bell MT" panose="02020503060305020303" pitchFamily="18" charset="0"/>
+              </a:rPr>
+              <a:t>source version control system</a:t>
+            </a:r>
+            <a:r>
+              <a:rPr lang="en-US" dirty="0" smtClean="0">
+                <a:latin typeface="Bell MT" panose="02020503060305020303" pitchFamily="18" charset="0"/>
+              </a:rPr>
+              <a:t>.</a:t>
+            </a:r>
+            <a:endParaRPr lang="en-US" dirty="0" smtClean="0">
+              <a:latin typeface="Bell MT" panose="02020503060305020303" pitchFamily="18" charset="0"/>
+            </a:endParaRPr>
           </a:p>
           <a:p>
             <a:pPr marL="285750" indent="-285750">
@@ -5862,19 +5851,7 @@
               <a:rPr lang="en-US" dirty="0" smtClean="0">
                 <a:latin typeface="Bell MT" panose="02020503060305020303" pitchFamily="18" charset="0"/>
               </a:rPr>
-              <a:t> </a:t>
-            </a:r>
-            <a:r>
-              <a:rPr lang="en-US" dirty="0" smtClean="0">
-                <a:latin typeface="Bell MT" panose="02020503060305020303" pitchFamily="18" charset="0"/>
-              </a:rPr>
-              <a:t>is </a:t>
-            </a:r>
-            <a:r>
-              <a:rPr lang="en-US" dirty="0" smtClean="0">
-                <a:latin typeface="Bell MT" panose="02020503060305020303" pitchFamily="18" charset="0"/>
-              </a:rPr>
-              <a:t>pre-installed.</a:t>
+              <a:t> is pre-installed.</a:t>
             </a:r>
           </a:p>
           <a:p>
@@ -5901,25 +5878,31 @@
               <a:rPr lang="en-US" dirty="0" smtClean="0">
                 <a:latin typeface="Bell MT" panose="02020503060305020303" pitchFamily="18" charset="0"/>
               </a:rPr>
-              <a:t> for deploying the service to the environments. Because the given service is too simple, there will be only a deployment pipeline</a:t>
+              <a:t> for deploying the service to the environments. Because the given service is too simple, there will be only a deployment pipeline. The Jenkins server running the  pipeline should be provisioned with </a:t>
+            </a:r>
+            <a:r>
+              <a:rPr lang="en-US" dirty="0" err="1" smtClean="0">
+                <a:latin typeface="Bell MT" panose="02020503060305020303" pitchFamily="18" charset="0"/>
+              </a:rPr>
+              <a:t>Git</a:t>
             </a:r>
             <a:r>
               <a:rPr lang="en-US" dirty="0" smtClean="0">
                 <a:latin typeface="Bell MT" panose="02020503060305020303" pitchFamily="18" charset="0"/>
               </a:rPr>
-              <a:t>. The Jenkins server running the  pipeline should be provisioned with </a:t>
+              <a:t>, </a:t>
             </a:r>
             <a:r>
               <a:rPr lang="en-US" dirty="0" err="1" smtClean="0">
                 <a:latin typeface="Bell MT" panose="02020503060305020303" pitchFamily="18" charset="0"/>
               </a:rPr>
-              <a:t>Git</a:t>
+              <a:t>Ansible</a:t>
             </a:r>
             <a:r>
               <a:rPr lang="en-US" dirty="0" smtClean="0">
                 <a:latin typeface="Bell MT" panose="02020503060305020303" pitchFamily="18" charset="0"/>
               </a:rPr>
-              <a:t>, </a:t>
+              <a:t> executables, </a:t>
             </a:r>
             <a:r>
               <a:rPr lang="en-US" dirty="0" err="1" smtClean="0">
@@ -5931,23 +5914,14 @@
               <a:rPr lang="en-US" dirty="0" smtClean="0">
                 <a:latin typeface="Bell MT" panose="02020503060305020303" pitchFamily="18" charset="0"/>
               </a:rPr>
-              <a:t> executables, </a:t>
-            </a:r>
-            <a:r>
-              <a:rPr lang="en-US" dirty="0" err="1" smtClean="0">
-                <a:latin typeface="Bell MT" panose="02020503060305020303" pitchFamily="18" charset="0"/>
-              </a:rPr>
-              <a:t>Ansible</a:t>
+              <a:t> roles, inventories and playbooks</a:t>
             </a:r>
             <a:r>
               <a:rPr lang="en-US" dirty="0" smtClean="0">
                 <a:latin typeface="Bell MT" panose="02020503060305020303" pitchFamily="18" charset="0"/>
               </a:rPr>
-              <a:t> roles, inventories and playbooks.</a:t>
-            </a:r>
-            <a:endParaRPr lang="en-US" dirty="0" smtClean="0">
-              <a:latin typeface="Bell MT" panose="02020503060305020303" pitchFamily="18" charset="0"/>
-            </a:endParaRPr>
+              <a:t>.</a:t>
+            </a:r>
           </a:p>
           <a:p>
             <a:pPr marL="285750" indent="-285750">
@@ -5958,31 +5932,19 @@
               <a:buChar char="•"/>
             </a:pPr>
             <a:r>
+              <a:rPr lang="en-US" dirty="0">
+                <a:latin typeface="Bell MT" panose="02020503060305020303" pitchFamily="18" charset="0"/>
+              </a:rPr>
+              <a:t>I will not fully implement the strategy described in this presentation, because of lack of real environments, no real services to test and not enough time. And last but not least - no real funding </a:t>
+            </a:r>
+            <a:r>
               <a:rPr lang="en-US" dirty="0" smtClean="0">
                 <a:latin typeface="Bell MT" panose="02020503060305020303" pitchFamily="18" charset="0"/>
-              </a:rPr>
-              <a:t>I will not fully implement the strategy described in this presentation, because of lack of real environments, no real services and not enough time. And last but not least </a:t>
-            </a:r>
-            <a:r>
-              <a:rPr lang="en-US" dirty="0" smtClean="0">
-                <a:latin typeface="Bell MT" panose="02020503060305020303" pitchFamily="18" charset="0"/>
-              </a:rPr>
-              <a:t>- </a:t>
-            </a:r>
-            <a:r>
-              <a:rPr lang="en-US" dirty="0" smtClean="0">
-                <a:latin typeface="Bell MT" panose="02020503060305020303" pitchFamily="18" charset="0"/>
-              </a:rPr>
-              <a:t>no real funding </a:t>
-            </a:r>
-            <a:r>
-              <a:rPr lang="en-US" dirty="0" smtClean="0">
-                <a:latin typeface="Bell MT" panose="02020503060305020303" pitchFamily="18" charset="0"/>
                 <a:sym typeface="Wingdings" panose="05000000000000000000" pitchFamily="2" charset="2"/>
               </a:rPr>
               <a:t></a:t>
             </a:r>
-            <a:endParaRPr lang="en-US" dirty="0" smtClean="0">
+            <a:endParaRPr lang="en-US" dirty="0">
               <a:latin typeface="Bell MT" panose="02020503060305020303" pitchFamily="18" charset="0"/>
             </a:endParaRPr>
           </a:p>
@@ -5992,6 +5954,256 @@
     <p:extLst>
       <p:ext uri="{BB962C8B-B14F-4D97-AF65-F5344CB8AC3E}">
         <p14:creationId xmlns:p14="http://schemas.microsoft.com/office/powerpoint/2010/main" val="318217487"/>
+      </p:ext>
+    </p:extLst>
+  </p:cSld>
+  <p:clrMapOvr>
+    <a:masterClrMapping/>
+  </p:clrMapOvr>
+</p:sld>
+</file>
+
+<file path=ppt/slides/slide8.xml><?xml version="1.0" encoding="utf-8"?>
+<p:sld xmlns:a="http://schemas.openxmlformats.org/drawingml/2006/main" xmlns:r="http://schemas.openxmlformats.org/officeDocument/2006/relationships" xmlns:p="http://schemas.openxmlformats.org/presentationml/2006/main">
+  <p:cSld>
+    <p:spTree>
+      <p:nvGrpSpPr>
+        <p:cNvPr id="1" name=""/>
+        <p:cNvGrpSpPr/>
+        <p:nvPr/>
+      </p:nvGrpSpPr>
+      <p:grpSpPr>
+        <a:xfrm>
+          <a:off x="0" y="0"/>
+          <a:ext cx="0" cy="0"/>
+          <a:chOff x="0" y="0"/>
+          <a:chExt cx="0" cy="0"/>
+        </a:xfrm>
+      </p:grpSpPr>
+      <p:sp>
+        <p:nvSpPr>
+          <p:cNvPr id="3" name="Title 1"/>
+          <p:cNvSpPr txBox="1">
+            <a:spLocks/>
+          </p:cNvSpPr>
+          <p:nvPr/>
+        </p:nvSpPr>
+        <p:spPr>
+          <a:xfrm>
+            <a:off x="838200" y="60487"/>
+            <a:ext cx="10515600" cy="1325563"/>
+          </a:xfrm>
+          <a:prstGeom prst="rect">
+            <a:avLst/>
+          </a:prstGeom>
+        </p:spPr>
+        <p:txBody>
+          <a:bodyPr vert="horz" lIns="91440" tIns="45720" rIns="91440" bIns="45720" rtlCol="0" anchor="ctr">
+            <a:normAutofit/>
+          </a:bodyPr>
+          <a:lstStyle>
+            <a:lvl1pPr algn="l" defTabSz="914400" rtl="0" eaLnBrk="1" latinLnBrk="0" hangingPunct="1">
+              <a:lnSpc>
+                <a:spcPct val="90000"/>
+              </a:lnSpc>
+              <a:spcBef>
+                <a:spcPct val="0"/>
+              </a:spcBef>
+              <a:buNone/>
+              <a:defRPr sz="4400" kern="1200">
+                <a:solidFill>
+                  <a:schemeClr val="tx1"/>
+                </a:solidFill>
+                <a:latin typeface="+mj-lt"/>
+                <a:ea typeface="+mj-ea"/>
+                <a:cs typeface="+mj-cs"/>
+              </a:defRPr>
+            </a:lvl1pPr>
+          </a:lstStyle>
+          <a:p>
+            <a:r>
+              <a:rPr lang="en-US" dirty="0" smtClean="0"/>
+              <a:t>Details</a:t>
+            </a:r>
+            <a:endParaRPr lang="en-US" dirty="0" smtClean="0"/>
+          </a:p>
+        </p:txBody>
+      </p:sp>
+      <p:sp>
+        <p:nvSpPr>
+          <p:cNvPr id="4" name="TextBox 3"/>
+          <p:cNvSpPr txBox="1"/>
+          <p:nvPr/>
+        </p:nvSpPr>
+        <p:spPr>
+          <a:xfrm>
+            <a:off x="838200" y="1066532"/>
+            <a:ext cx="9860547" cy="3477875"/>
+          </a:xfrm>
+          <a:prstGeom prst="rect">
+            <a:avLst/>
+          </a:prstGeom>
+          <a:noFill/>
+        </p:spPr>
+        <p:txBody>
+          <a:bodyPr wrap="square" rtlCol="0">
+            <a:spAutoFit/>
+          </a:bodyPr>
+          <a:lstStyle/>
+          <a:p>
+            <a:pPr marL="285750" indent="-285750">
+              <a:spcAft>
+                <a:spcPts val="1200"/>
+              </a:spcAft>
+              <a:buFont typeface="Arial" panose="020B0604020202020204" pitchFamily="34" charset="0"/>
+              <a:buChar char="•"/>
+            </a:pPr>
+            <a:r>
+              <a:rPr lang="en-US" dirty="0" smtClean="0">
+                <a:latin typeface="Bell MT" panose="02020503060305020303" pitchFamily="18" charset="0"/>
+              </a:rPr>
+              <a:t>There </a:t>
+            </a:r>
+            <a:r>
+              <a:rPr lang="en-US" dirty="0">
+                <a:latin typeface="Bell MT" panose="02020503060305020303" pitchFamily="18" charset="0"/>
+              </a:rPr>
+              <a:t>will be </a:t>
+            </a:r>
+            <a:r>
+              <a:rPr lang="en-US" dirty="0" smtClean="0">
+                <a:latin typeface="Bell MT" panose="02020503060305020303" pitchFamily="18" charset="0"/>
+              </a:rPr>
+              <a:t>one pipelines </a:t>
+            </a:r>
+            <a:r>
+              <a:rPr lang="en-US" dirty="0">
+                <a:latin typeface="Bell MT" panose="02020503060305020303" pitchFamily="18" charset="0"/>
+              </a:rPr>
+              <a:t>configured per service, lets say for the service “service-1</a:t>
+            </a:r>
+            <a:r>
+              <a:rPr lang="en-US" dirty="0" smtClean="0">
+                <a:latin typeface="Bell MT" panose="02020503060305020303" pitchFamily="18" charset="0"/>
+              </a:rPr>
+              <a:t>”:</a:t>
+            </a:r>
+          </a:p>
+          <a:p>
+            <a:pPr lvl="1">
+              <a:spcAft>
+                <a:spcPts val="1200"/>
+              </a:spcAft>
+            </a:pPr>
+            <a:r>
+              <a:rPr lang="en-US" b="1" dirty="0" smtClean="0">
+                <a:latin typeface="Bell MT" panose="02020503060305020303" pitchFamily="18" charset="0"/>
+              </a:rPr>
+              <a:t>deploy-service-1</a:t>
+            </a:r>
+            <a:r>
+              <a:rPr lang="en-US" dirty="0" smtClean="0">
+                <a:latin typeface="Bell MT" panose="02020503060305020303" pitchFamily="18" charset="0"/>
+              </a:rPr>
+              <a:t> -&gt; triggered automatically on merge to master</a:t>
+            </a:r>
+          </a:p>
+          <a:p>
+            <a:pPr marL="285750" indent="-285750">
+              <a:spcAft>
+                <a:spcPts val="1200"/>
+              </a:spcAft>
+              <a:buFont typeface="Arial" panose="020B0604020202020204" pitchFamily="34" charset="0"/>
+              <a:buChar char="•"/>
+            </a:pPr>
+            <a:r>
+              <a:rPr lang="en-US" dirty="0" smtClean="0">
+                <a:latin typeface="Bell MT" panose="02020503060305020303" pitchFamily="18" charset="0"/>
+              </a:rPr>
+              <a:t>There is a confirmation stage for the production deployment. If confirmation is not given or the time expires the deployment will be abandoned. After positive confirmation the pipeline will proceed with deployment on production.</a:t>
+            </a:r>
+          </a:p>
+          <a:p>
+            <a:pPr marL="285750" indent="-285750">
+              <a:spcAft>
+                <a:spcPts val="1200"/>
+              </a:spcAft>
+              <a:buFont typeface="Arial" panose="020B0604020202020204" pitchFamily="34" charset="0"/>
+              <a:buChar char="•"/>
+            </a:pPr>
+            <a:r>
+              <a:rPr lang="en-US" dirty="0" smtClean="0">
+                <a:latin typeface="Bell MT" panose="02020503060305020303" pitchFamily="18" charset="0"/>
+              </a:rPr>
+              <a:t>The </a:t>
+            </a:r>
+            <a:r>
+              <a:rPr lang="en-US" dirty="0" err="1" smtClean="0">
+                <a:latin typeface="Bell MT" panose="02020503060305020303" pitchFamily="18" charset="0"/>
+              </a:rPr>
+              <a:t>Jenkinsfile</a:t>
+            </a:r>
+            <a:r>
+              <a:rPr lang="en-US" dirty="0" smtClean="0">
+                <a:latin typeface="Bell MT" panose="02020503060305020303" pitchFamily="18" charset="0"/>
+              </a:rPr>
+              <a:t> can be </a:t>
+            </a:r>
+            <a:r>
+              <a:rPr lang="en-US" dirty="0">
+                <a:latin typeface="Bell MT" panose="02020503060305020303" pitchFamily="18" charset="0"/>
+              </a:rPr>
+              <a:t>in the service repository, </a:t>
+            </a:r>
+            <a:r>
+              <a:rPr lang="en-US" dirty="0" smtClean="0">
+                <a:latin typeface="Bell MT" panose="02020503060305020303" pitchFamily="18" charset="0"/>
+              </a:rPr>
+              <a:t>or script can be configured on the </a:t>
+            </a:r>
+            <a:r>
+              <a:rPr lang="en-US" dirty="0" err="1" smtClean="0">
+                <a:latin typeface="Bell MT" panose="02020503060305020303" pitchFamily="18" charset="0"/>
+              </a:rPr>
+              <a:t>Jankins</a:t>
+            </a:r>
+            <a:r>
+              <a:rPr lang="en-US" dirty="0" smtClean="0">
+                <a:latin typeface="Bell MT" panose="02020503060305020303" pitchFamily="18" charset="0"/>
+              </a:rPr>
+              <a:t> pipeline itself. If steps are identical for all developed services it is better to keep the scripts is separate repository, if there are a lot of specific steps per service, than better to have </a:t>
+            </a:r>
+            <a:r>
+              <a:rPr lang="en-US" dirty="0" err="1" smtClean="0">
+                <a:latin typeface="Bell MT" panose="02020503060305020303" pitchFamily="18" charset="0"/>
+              </a:rPr>
+              <a:t>Jenkinsfile</a:t>
+            </a:r>
+            <a:r>
+              <a:rPr lang="en-US" dirty="0" smtClean="0">
+                <a:latin typeface="Bell MT" panose="02020503060305020303" pitchFamily="18" charset="0"/>
+              </a:rPr>
+              <a:t> in each repository.</a:t>
+            </a:r>
+          </a:p>
+          <a:p>
+            <a:pPr marL="285750" indent="-285750">
+              <a:spcAft>
+                <a:spcPts val="1200"/>
+              </a:spcAft>
+              <a:buFont typeface="Arial" panose="020B0604020202020204" pitchFamily="34" charset="0"/>
+              <a:buChar char="•"/>
+            </a:pPr>
+            <a:endParaRPr lang="en-US" dirty="0">
+              <a:latin typeface="Bell MT" panose="02020503060305020303" pitchFamily="18" charset="0"/>
+            </a:endParaRPr>
+          </a:p>
+        </p:txBody>
+      </p:sp>
+    </p:spTree>
+    <p:extLst>
+      <p:ext uri="{BB962C8B-B14F-4D97-AF65-F5344CB8AC3E}">
+        <p14:creationId xmlns:p14="http://schemas.microsoft.com/office/powerpoint/2010/main" val="2806627007"/>
       </p:ext>
     </p:extLst>
   </p:cSld>

</xml_diff>